<commit_message>
Modified the input document
</commit_message>
<xml_diff>
--- a/PPTX-to-Image-conversion/Add-font-substitution/.NET-Framework/Add-font-substitution/Data/Template.pptx
+++ b/PPTX-to-Image-conversion/Add-font-substitution/.NET-Framework/Add-font-substitution/Data/Template.pptx
@@ -5,17 +5,17 @@
     <p:sldMasterId id="2147483648" r:id="rId1"/>
   </p:sldMasterIdLst>
   <p:sldIdLst>
-    <p:sldId id="256" r:id="rId3"/>
-    <p:sldId id="257" r:id="rId2"/>
+    <p:sldId id="256" r:id="rId2"/>
+    <p:sldId id="257" r:id="rId3"/>
     <p:sldId id="261" r:id="rId4"/>
   </p:sldIdLst>
-  <p:sldSz cx="12192000" cy="6858000" type="custom"/>
+  <p:sldSz cx="12192000" cy="6858000"/>
   <p:notesSz cx="6858000" cy="9144000"/>
   <p:defaultTextStyle>
     <a:defPPr defTabSz="914400">
       <a:defRPr lang="en-US" dirty="0"/>
     </a:defPPr>
-    <a:lvl1pPr marL="0" rtl="0" algn="l" defTabSz="914400">
+    <a:lvl1pPr marL="0" algn="l" defTabSz="914400" rtl="0">
       <a:defRPr sz="1800" kern="1200" dirty="0">
         <a:solidFill>
           <a:schemeClr val="tx1"/>
@@ -25,7 +25,7 @@
         <a:cs typeface="+mn-cs"/>
       </a:defRPr>
     </a:lvl1pPr>
-    <a:lvl2pPr marL="457200" rtl="0" algn="l" defTabSz="914400">
+    <a:lvl2pPr marL="457200" algn="l" defTabSz="914400" rtl="0">
       <a:defRPr sz="1800" kern="1200" dirty="0">
         <a:solidFill>
           <a:schemeClr val="tx1"/>
@@ -35,7 +35,7 @@
         <a:cs typeface="+mn-cs"/>
       </a:defRPr>
     </a:lvl2pPr>
-    <a:lvl3pPr marL="914400" rtl="0" algn="l" defTabSz="914400">
+    <a:lvl3pPr marL="914400" algn="l" defTabSz="914400" rtl="0">
       <a:defRPr sz="1800" kern="1200" dirty="0">
         <a:solidFill>
           <a:schemeClr val="tx1"/>
@@ -45,7 +45,7 @@
         <a:cs typeface="+mn-cs"/>
       </a:defRPr>
     </a:lvl3pPr>
-    <a:lvl4pPr marL="1371600" rtl="0" algn="l" defTabSz="914400">
+    <a:lvl4pPr marL="1371600" algn="l" defTabSz="914400" rtl="0">
       <a:defRPr sz="1800" kern="1200" dirty="0">
         <a:solidFill>
           <a:schemeClr val="tx1"/>
@@ -55,7 +55,7 @@
         <a:cs typeface="+mn-cs"/>
       </a:defRPr>
     </a:lvl4pPr>
-    <a:lvl5pPr marL="1828800" rtl="0" algn="l" defTabSz="914400">
+    <a:lvl5pPr marL="1828800" algn="l" defTabSz="914400" rtl="0">
       <a:defRPr sz="1800" kern="1200" dirty="0">
         <a:solidFill>
           <a:schemeClr val="tx1"/>
@@ -65,7 +65,7 @@
         <a:cs typeface="+mn-cs"/>
       </a:defRPr>
     </a:lvl5pPr>
-    <a:lvl6pPr marL="2286000" rtl="0" algn="l" defTabSz="914400">
+    <a:lvl6pPr marL="2286000" algn="l" defTabSz="914400" rtl="0">
       <a:defRPr sz="1800" kern="1200" dirty="0">
         <a:solidFill>
           <a:schemeClr val="tx1"/>
@@ -75,7 +75,7 @@
         <a:cs typeface="+mn-cs"/>
       </a:defRPr>
     </a:lvl6pPr>
-    <a:lvl7pPr marL="2743200" rtl="0" algn="l" defTabSz="914400">
+    <a:lvl7pPr marL="2743200" algn="l" defTabSz="914400" rtl="0">
       <a:defRPr sz="1800" kern="1200" dirty="0">
         <a:solidFill>
           <a:schemeClr val="tx1"/>
@@ -85,7 +85,7 @@
         <a:cs typeface="+mn-cs"/>
       </a:defRPr>
     </a:lvl7pPr>
-    <a:lvl8pPr marL="3200400" rtl="0" algn="l" defTabSz="914400">
+    <a:lvl8pPr marL="3200400" algn="l" defTabSz="914400" rtl="0">
       <a:defRPr sz="1800" kern="1200" dirty="0">
         <a:solidFill>
           <a:schemeClr val="tx1"/>
@@ -95,7 +95,7 @@
         <a:cs typeface="+mn-cs"/>
       </a:defRPr>
     </a:lvl8pPr>
-    <a:lvl9pPr marL="3657600" rtl="0" algn="l" defTabSz="914400">
+    <a:lvl9pPr marL="3657600" algn="l" defTabSz="914400" rtl="0">
       <a:defRPr sz="1800" kern="1200" dirty="0">
         <a:solidFill>
           <a:schemeClr val="tx1"/>
@@ -106,11 +106,12 @@
       </a:defRPr>
     </a:lvl9pPr>
   </p:defaultTextStyle>
+  <p:extLst>
+    <p:ext uri="{EFAFB233-063F-42B5-8137-9DF3F51BA10A}">
+      <p15:sldGuideLst xmlns:p15="http://schemas.microsoft.com/office/powerpoint/2012/main"/>
+    </p:ext>
+  </p:extLst>
 </p:presentation>
-</file>
-
-<file path=ppt/commentAuthors.xml><?xml version="1.0" encoding="utf-8"?>
-<p:cmAuthorLst xmlns:a="http://schemas.openxmlformats.org/drawingml/2006/main" xmlns:r="http://schemas.openxmlformats.org/officeDocument/2006/relationships" xmlns:p="http://schemas.openxmlformats.org/presentationml/2006/main"/>
 </file>
 
 <file path=ppt/slideLayouts/slideLayout1.xml><?xml version="1.0" encoding="utf-8"?>
@@ -151,14 +152,13 @@
           </a:ln>
         </p:spPr>
         <p:txBody>
-          <a:bodyPr anchor="b" wrap="square"/>
+          <a:bodyPr wrap="square" anchor="b"/>
           <a:lstStyle>
             <a:lvl1pPr algn="ctr">
               <a:defRPr sz="6000" dirty="0"/>
             </a:lvl1pPr>
           </a:lstStyle>
           <a:p>
-            <a:pPr/>
             <a:r>
               <a:rPr lang="en-US" dirty="0"/>
               <a:t>Click to edit Master title style</a:t>
@@ -227,7 +227,6 @@
             </a:lvl9pPr>
           </a:lstStyle>
           <a:p>
-            <a:pPr/>
             <a:r>
               <a:rPr lang="en-US" dirty="0"/>
               <a:t>Click to edit Master subtitle style</a:t>
@@ -255,10 +254,9 @@
           <a:bodyPr wrap="square"/>
           <a:lstStyle/>
           <a:p>
-            <a:pPr/>
             <a:fld id="{5455A7CF-DB6C-4325-93B5-8C3F06D80356}" type="datetimeFigureOut">
               <a:rPr lang="en-US" dirty="0"/>
-              <a:t>25-Nov-22</a:t>
+              <a:t>1/19/2024</a:t>
             </a:fld>
             <a:endParaRPr lang="en-US" dirty="0"/>
           </a:p>
@@ -284,7 +282,6 @@
           <a:bodyPr wrap="square"/>
           <a:lstStyle/>
           <a:p>
-            <a:pPr/>
             <a:endParaRPr lang="en-US" dirty="0"/>
           </a:p>
         </p:txBody>
@@ -309,7 +306,6 @@
           <a:bodyPr wrap="square"/>
           <a:lstStyle/>
           <a:p>
-            <a:pPr/>
             <a:fld id="{24E76E65-7777-4C32-B153-6028045D6BD3}" type="slidenum">
               <a:rPr lang="en-US" dirty="0"/>
               <a:t>‹#›</a:t>
@@ -363,7 +359,6 @@
           <a:bodyPr wrap="square"/>
           <a:lstStyle/>
           <a:p>
-            <a:pPr/>
             <a:r>
               <a:rPr lang="en-US" dirty="0"/>
               <a:t>Click to edit Master title style</a:t>
@@ -391,7 +386,6 @@
           <a:bodyPr vert="eaVert" wrap="square"/>
           <a:lstStyle/>
           <a:p>
-            <a:pPr/>
             <a:r>
               <a:rPr lang="en-US" dirty="0"/>
               <a:t>Edit Master text styles</a:t>
@@ -447,10 +441,9 @@
           <a:bodyPr wrap="square"/>
           <a:lstStyle/>
           <a:p>
-            <a:pPr/>
             <a:fld id="{5455A7CF-DB6C-4325-93B5-8C3F06D80356}" type="datetimeFigureOut">
               <a:rPr lang="en-US" dirty="0"/>
-              <a:t>25-Nov-22</a:t>
+              <a:t>1/19/2024</a:t>
             </a:fld>
             <a:endParaRPr lang="en-US" dirty="0"/>
           </a:p>
@@ -476,7 +469,6 @@
           <a:bodyPr wrap="square"/>
           <a:lstStyle/>
           <a:p>
-            <a:pPr/>
             <a:endParaRPr lang="en-US" dirty="0"/>
           </a:p>
         </p:txBody>
@@ -501,7 +493,6 @@
           <a:bodyPr wrap="square"/>
           <a:lstStyle/>
           <a:p>
-            <a:pPr/>
             <a:fld id="{24E76E65-7777-4C32-B153-6028045D6BD3}" type="slidenum">
               <a:rPr lang="en-US" dirty="0"/>
               <a:t>‹#›</a:t>
@@ -559,7 +550,6 @@
           <a:bodyPr vert="eaVert" wrap="square"/>
           <a:lstStyle/>
           <a:p>
-            <a:pPr/>
             <a:r>
               <a:rPr lang="en-US" dirty="0"/>
               <a:t>Click to edit Master title style</a:t>
@@ -591,7 +581,6 @@
           <a:bodyPr vert="eaVert" wrap="square"/>
           <a:lstStyle/>
           <a:p>
-            <a:pPr/>
             <a:r>
               <a:rPr lang="en-US" dirty="0"/>
               <a:t>Edit Master text styles</a:t>
@@ -647,10 +636,9 @@
           <a:bodyPr wrap="square"/>
           <a:lstStyle/>
           <a:p>
-            <a:pPr/>
             <a:fld id="{5455A7CF-DB6C-4325-93B5-8C3F06D80356}" type="datetimeFigureOut">
               <a:rPr lang="en-US" dirty="0"/>
-              <a:t>25-Nov-22</a:t>
+              <a:t>1/19/2024</a:t>
             </a:fld>
             <a:endParaRPr lang="en-US" dirty="0"/>
           </a:p>
@@ -676,7 +664,6 @@
           <a:bodyPr wrap="square"/>
           <a:lstStyle/>
           <a:p>
-            <a:pPr/>
             <a:endParaRPr lang="en-US" dirty="0"/>
           </a:p>
         </p:txBody>
@@ -701,7 +688,6 @@
           <a:bodyPr wrap="square"/>
           <a:lstStyle/>
           <a:p>
-            <a:pPr/>
             <a:fld id="{24E76E65-7777-4C32-B153-6028045D6BD3}" type="slidenum">
               <a:rPr lang="en-US" dirty="0"/>
               <a:t>‹#›</a:t>
@@ -755,7 +741,6 @@
           <a:bodyPr wrap="square"/>
           <a:lstStyle/>
           <a:p>
-            <a:pPr/>
             <a:r>
               <a:rPr lang="en-US" dirty="0"/>
               <a:t>Click to edit Master title style</a:t>
@@ -783,7 +768,6 @@
           <a:bodyPr wrap="square"/>
           <a:lstStyle/>
           <a:p>
-            <a:pPr/>
             <a:r>
               <a:rPr lang="en-US" dirty="0"/>
               <a:t>Edit Master text styles</a:t>
@@ -839,10 +823,9 @@
           <a:bodyPr wrap="square"/>
           <a:lstStyle/>
           <a:p>
-            <a:pPr/>
             <a:fld id="{5455A7CF-DB6C-4325-93B5-8C3F06D80356}" type="datetimeFigureOut">
               <a:rPr lang="en-US" dirty="0"/>
-              <a:t>25-Nov-22</a:t>
+              <a:t>1/19/2024</a:t>
             </a:fld>
             <a:endParaRPr lang="en-US" dirty="0"/>
           </a:p>
@@ -868,7 +851,6 @@
           <a:bodyPr wrap="square"/>
           <a:lstStyle/>
           <a:p>
-            <a:pPr/>
             <a:endParaRPr lang="en-US" dirty="0"/>
           </a:p>
         </p:txBody>
@@ -893,7 +875,6 @@
           <a:bodyPr wrap="square"/>
           <a:lstStyle/>
           <a:p>
-            <a:pPr/>
             <a:fld id="{24E76E65-7777-4C32-B153-6028045D6BD3}" type="slidenum">
               <a:rPr lang="en-US" dirty="0"/>
               <a:t>‹#›</a:t>
@@ -948,14 +929,13 @@
           </a:ln>
         </p:spPr>
         <p:txBody>
-          <a:bodyPr anchor="b" wrap="square"/>
+          <a:bodyPr wrap="square" anchor="b"/>
           <a:lstStyle>
             <a:lvl1pPr>
               <a:defRPr sz="6000" dirty="0"/>
             </a:lvl1pPr>
           </a:lstStyle>
           <a:p>
-            <a:pPr/>
             <a:r>
               <a:rPr lang="en-US" dirty="0"/>
               <a:t>Click to edit Master title style</a:t>
@@ -1078,7 +1058,6 @@
             </a:lvl9pPr>
           </a:lstStyle>
           <a:p>
-            <a:pPr/>
             <a:r>
               <a:rPr lang="en-US" dirty="0"/>
               <a:t>Edit Master text styles</a:t>
@@ -1106,10 +1085,9 @@
           <a:bodyPr wrap="square"/>
           <a:lstStyle/>
           <a:p>
-            <a:pPr/>
             <a:fld id="{5455A7CF-DB6C-4325-93B5-8C3F06D80356}" type="datetimeFigureOut">
               <a:rPr lang="en-US" dirty="0"/>
-              <a:t>25-Nov-22</a:t>
+              <a:t>1/19/2024</a:t>
             </a:fld>
             <a:endParaRPr lang="en-US" dirty="0"/>
           </a:p>
@@ -1135,7 +1113,6 @@
           <a:bodyPr wrap="square"/>
           <a:lstStyle/>
           <a:p>
-            <a:pPr/>
             <a:endParaRPr lang="en-US" dirty="0"/>
           </a:p>
         </p:txBody>
@@ -1160,7 +1137,6 @@
           <a:bodyPr wrap="square"/>
           <a:lstStyle/>
           <a:p>
-            <a:pPr/>
             <a:fld id="{24E76E65-7777-4C32-B153-6028045D6BD3}" type="slidenum">
               <a:rPr lang="en-US" dirty="0"/>
               <a:t>‹#›</a:t>
@@ -1214,7 +1190,6 @@
           <a:bodyPr wrap="square"/>
           <a:lstStyle/>
           <a:p>
-            <a:pPr/>
             <a:r>
               <a:rPr lang="en-US" dirty="0"/>
               <a:t>Click to edit Master title style</a:t>
@@ -1246,7 +1221,6 @@
           <a:bodyPr wrap="square"/>
           <a:lstStyle/>
           <a:p>
-            <a:pPr/>
             <a:r>
               <a:rPr lang="en-US" dirty="0"/>
               <a:t>Edit Master text styles</a:t>
@@ -1306,7 +1280,6 @@
           <a:bodyPr wrap="square"/>
           <a:lstStyle/>
           <a:p>
-            <a:pPr/>
             <a:r>
               <a:rPr lang="en-US" dirty="0"/>
               <a:t>Edit Master text styles</a:t>
@@ -1362,10 +1335,9 @@
           <a:bodyPr wrap="square"/>
           <a:lstStyle/>
           <a:p>
-            <a:pPr/>
             <a:fld id="{5455A7CF-DB6C-4325-93B5-8C3F06D80356}" type="datetimeFigureOut">
               <a:rPr lang="en-US" dirty="0"/>
-              <a:t>25-Nov-22</a:t>
+              <a:t>1/19/2024</a:t>
             </a:fld>
             <a:endParaRPr lang="en-US" dirty="0"/>
           </a:p>
@@ -1391,7 +1363,6 @@
           <a:bodyPr wrap="square"/>
           <a:lstStyle/>
           <a:p>
-            <a:pPr/>
             <a:endParaRPr lang="en-US" dirty="0"/>
           </a:p>
         </p:txBody>
@@ -1416,7 +1387,6 @@
           <a:bodyPr wrap="square"/>
           <a:lstStyle/>
           <a:p>
-            <a:pPr/>
             <a:fld id="{24E76E65-7777-4C32-B153-6028045D6BD3}" type="slidenum">
               <a:rPr lang="en-US" dirty="0"/>
               <a:t>‹#›</a:t>
@@ -1474,7 +1444,6 @@
           <a:bodyPr wrap="square"/>
           <a:lstStyle/>
           <a:p>
-            <a:pPr/>
             <a:r>
               <a:rPr lang="en-US" dirty="0"/>
               <a:t>Click to edit Master title style</a:t>
@@ -1503,7 +1472,7 @@
           </a:ln>
         </p:spPr>
         <p:txBody>
-          <a:bodyPr anchor="b" wrap="square"/>
+          <a:bodyPr wrap="square" anchor="b"/>
           <a:lstStyle>
             <a:lvl1pPr marL="0" indent="0">
               <a:buNone/>
@@ -1543,7 +1512,6 @@
             </a:lvl9pPr>
           </a:lstStyle>
           <a:p>
-            <a:pPr/>
             <a:r>
               <a:rPr lang="en-US" dirty="0"/>
               <a:t>Edit Master text styles</a:t>
@@ -1575,7 +1543,6 @@
           <a:bodyPr wrap="square"/>
           <a:lstStyle/>
           <a:p>
-            <a:pPr/>
             <a:r>
               <a:rPr lang="en-US" dirty="0"/>
               <a:t>Edit Master text styles</a:t>
@@ -1632,7 +1599,7 @@
           </a:ln>
         </p:spPr>
         <p:txBody>
-          <a:bodyPr anchor="b" wrap="square"/>
+          <a:bodyPr wrap="square" anchor="b"/>
           <a:lstStyle>
             <a:lvl1pPr marL="0" indent="0">
               <a:buNone/>
@@ -1672,7 +1639,6 @@
             </a:lvl9pPr>
           </a:lstStyle>
           <a:p>
-            <a:pPr/>
             <a:r>
               <a:rPr lang="en-US" dirty="0"/>
               <a:t>Edit Master text styles</a:t>
@@ -1704,7 +1670,6 @@
           <a:bodyPr wrap="square"/>
           <a:lstStyle/>
           <a:p>
-            <a:pPr/>
             <a:r>
               <a:rPr lang="en-US" dirty="0"/>
               <a:t>Edit Master text styles</a:t>
@@ -1760,10 +1725,9 @@
           <a:bodyPr wrap="square"/>
           <a:lstStyle/>
           <a:p>
-            <a:pPr/>
             <a:fld id="{5455A7CF-DB6C-4325-93B5-8C3F06D80356}" type="datetimeFigureOut">
               <a:rPr lang="en-US" dirty="0"/>
-              <a:t>25-Nov-22</a:t>
+              <a:t>1/19/2024</a:t>
             </a:fld>
             <a:endParaRPr lang="en-US" dirty="0"/>
           </a:p>
@@ -1789,7 +1753,6 @@
           <a:bodyPr wrap="square"/>
           <a:lstStyle/>
           <a:p>
-            <a:pPr/>
             <a:endParaRPr lang="en-US" dirty="0"/>
           </a:p>
         </p:txBody>
@@ -1814,7 +1777,6 @@
           <a:bodyPr wrap="square"/>
           <a:lstStyle/>
           <a:p>
-            <a:pPr/>
             <a:fld id="{24E76E65-7777-4C32-B153-6028045D6BD3}" type="slidenum">
               <a:rPr lang="en-US" dirty="0"/>
               <a:t>‹#›</a:t>
@@ -1868,7 +1830,6 @@
           <a:bodyPr wrap="square"/>
           <a:lstStyle/>
           <a:p>
-            <a:pPr/>
             <a:r>
               <a:rPr lang="en-US" dirty="0"/>
               <a:t>Click to edit Master title style</a:t>
@@ -1896,10 +1857,9 @@
           <a:bodyPr wrap="square"/>
           <a:lstStyle/>
           <a:p>
-            <a:pPr/>
             <a:fld id="{5455A7CF-DB6C-4325-93B5-8C3F06D80356}" type="datetimeFigureOut">
               <a:rPr lang="en-US" dirty="0"/>
-              <a:t>25-Nov-22</a:t>
+              <a:t>1/19/2024</a:t>
             </a:fld>
             <a:endParaRPr lang="en-US" dirty="0"/>
           </a:p>
@@ -1925,7 +1885,6 @@
           <a:bodyPr wrap="square"/>
           <a:lstStyle/>
           <a:p>
-            <a:pPr/>
             <a:endParaRPr lang="en-US" dirty="0"/>
           </a:p>
         </p:txBody>
@@ -1950,7 +1909,6 @@
           <a:bodyPr wrap="square"/>
           <a:lstStyle/>
           <a:p>
-            <a:pPr/>
             <a:fld id="{24E76E65-7777-4C32-B153-6028045D6BD3}" type="slidenum">
               <a:rPr lang="en-US" dirty="0"/>
               <a:t>‹#›</a:t>
@@ -2004,10 +1962,9 @@
           <a:bodyPr wrap="square"/>
           <a:lstStyle/>
           <a:p>
-            <a:pPr/>
             <a:fld id="{5455A7CF-DB6C-4325-93B5-8C3F06D80356}" type="datetimeFigureOut">
               <a:rPr lang="en-US" dirty="0"/>
-              <a:t>25-Nov-22</a:t>
+              <a:t>1/19/2024</a:t>
             </a:fld>
             <a:endParaRPr lang="en-US" dirty="0"/>
           </a:p>
@@ -2033,7 +1990,6 @@
           <a:bodyPr wrap="square"/>
           <a:lstStyle/>
           <a:p>
-            <a:pPr/>
             <a:endParaRPr lang="en-US" dirty="0"/>
           </a:p>
         </p:txBody>
@@ -2058,7 +2014,6 @@
           <a:bodyPr wrap="square"/>
           <a:lstStyle/>
           <a:p>
-            <a:pPr/>
             <a:fld id="{24E76E65-7777-4C32-B153-6028045D6BD3}" type="slidenum">
               <a:rPr lang="en-US" dirty="0"/>
               <a:t>‹#›</a:t>
@@ -2113,14 +2068,13 @@
           </a:ln>
         </p:spPr>
         <p:txBody>
-          <a:bodyPr anchor="b" wrap="square"/>
+          <a:bodyPr wrap="square" anchor="b"/>
           <a:lstStyle>
             <a:lvl1pPr>
               <a:defRPr sz="3200" dirty="0"/>
             </a:lvl1pPr>
           </a:lstStyle>
           <a:p>
-            <a:pPr/>
             <a:r>
               <a:rPr lang="en-US" dirty="0"/>
               <a:t>Click to edit Master title style</a:t>
@@ -2180,7 +2134,6 @@
             </a:lvl9pPr>
           </a:lstStyle>
           <a:p>
-            <a:pPr/>
             <a:r>
               <a:rPr lang="en-US" dirty="0"/>
               <a:t>Edit Master text styles</a:t>
@@ -2277,7 +2230,6 @@
             </a:lvl9pPr>
           </a:lstStyle>
           <a:p>
-            <a:pPr/>
             <a:r>
               <a:rPr lang="en-US" dirty="0"/>
               <a:t>Edit Master text styles</a:t>
@@ -2305,10 +2257,9 @@
           <a:bodyPr wrap="square"/>
           <a:lstStyle/>
           <a:p>
-            <a:pPr/>
             <a:fld id="{5455A7CF-DB6C-4325-93B5-8C3F06D80356}" type="datetimeFigureOut">
               <a:rPr lang="en-US" dirty="0"/>
-              <a:t>25-Nov-22</a:t>
+              <a:t>1/19/2024</a:t>
             </a:fld>
             <a:endParaRPr lang="en-US" dirty="0"/>
           </a:p>
@@ -2334,7 +2285,6 @@
           <a:bodyPr wrap="square"/>
           <a:lstStyle/>
           <a:p>
-            <a:pPr/>
             <a:endParaRPr lang="en-US" dirty="0"/>
           </a:p>
         </p:txBody>
@@ -2359,7 +2309,6 @@
           <a:bodyPr wrap="square"/>
           <a:lstStyle/>
           <a:p>
-            <a:pPr/>
             <a:fld id="{24E76E65-7777-4C32-B153-6028045D6BD3}" type="slidenum">
               <a:rPr lang="en-US" dirty="0"/>
               <a:t>‹#›</a:t>
@@ -2414,14 +2363,13 @@
           </a:ln>
         </p:spPr>
         <p:txBody>
-          <a:bodyPr anchor="b" wrap="square"/>
+          <a:bodyPr wrap="square" anchor="b"/>
           <a:lstStyle>
             <a:lvl1pPr>
               <a:defRPr sz="3200" dirty="0"/>
             </a:lvl1pPr>
           </a:lstStyle>
           <a:p>
-            <a:pPr/>
             <a:r>
               <a:rPr lang="en-US" dirty="0"/>
               <a:t>Click to edit Master title style</a:t>
@@ -2490,7 +2438,6 @@
             </a:lvl9pPr>
           </a:lstStyle>
           <a:p>
-            <a:pPr/>
             <a:endParaRPr lang="en-US" dirty="0"/>
           </a:p>
         </p:txBody>
@@ -2556,7 +2503,6 @@
             </a:lvl9pPr>
           </a:lstStyle>
           <a:p>
-            <a:pPr/>
             <a:r>
               <a:rPr lang="en-US" dirty="0"/>
               <a:t>Edit Master text styles</a:t>
@@ -2584,10 +2530,9 @@
           <a:bodyPr wrap="square"/>
           <a:lstStyle/>
           <a:p>
-            <a:pPr/>
             <a:fld id="{5455A7CF-DB6C-4325-93B5-8C3F06D80356}" type="datetimeFigureOut">
               <a:rPr lang="en-US" dirty="0"/>
-              <a:t>25-Nov-22</a:t>
+              <a:t>1/19/2024</a:t>
             </a:fld>
             <a:endParaRPr lang="en-US" dirty="0"/>
           </a:p>
@@ -2613,7 +2558,6 @@
           <a:bodyPr wrap="square"/>
           <a:lstStyle/>
           <a:p>
-            <a:pPr/>
             <a:endParaRPr lang="en-US" dirty="0"/>
           </a:p>
         </p:txBody>
@@ -2638,7 +2582,6 @@
           <a:bodyPr wrap="square"/>
           <a:lstStyle/>
           <a:p>
-            <a:pPr/>
             <a:fld id="{24E76E65-7777-4C32-B153-6028045D6BD3}" type="slidenum">
               <a:rPr lang="en-US" dirty="0"/>
               <a:t>‹#›</a:t>
@@ -2663,6 +2606,7 @@
         <a:solidFill>
           <a:schemeClr val="bg1"/>
         </a:solidFill>
+        <a:effectLst/>
       </p:bgPr>
     </p:bg>
     <p:spTree>
@@ -2703,12 +2647,11 @@
           </a:ln>
         </p:spPr>
         <p:txBody>
-          <a:bodyPr lIns="91440" tIns="45720" rIns="91440" bIns="45720" anchor="ctr" wrap="square">
+          <a:bodyPr wrap="square" lIns="91440" tIns="45720" rIns="91440" bIns="45720" anchor="ctr">
             <a:normAutofit/>
           </a:bodyPr>
           <a:lstStyle/>
           <a:p>
-            <a:pPr/>
             <a:r>
               <a:rPr lang="en-US" dirty="0"/>
               <a:t>Click to edit Master title style</a:t>
@@ -2740,12 +2683,11 @@
           </a:ln>
         </p:spPr>
         <p:txBody>
-          <a:bodyPr lIns="91440" tIns="45720" rIns="91440" bIns="45720" wrap="square">
+          <a:bodyPr wrap="square" lIns="91440" tIns="45720" rIns="91440" bIns="45720">
             <a:normAutofit/>
           </a:bodyPr>
           <a:lstStyle/>
           <a:p>
-            <a:pPr/>
             <a:r>
               <a:rPr lang="en-US" dirty="0"/>
               <a:t>Edit Master text styles</a:t>
@@ -2805,7 +2747,7 @@
           </a:ln>
         </p:spPr>
         <p:txBody>
-          <a:bodyPr lIns="91440" tIns="45720" rIns="91440" bIns="45720" anchor="ctr" wrap="square"/>
+          <a:bodyPr wrap="square" lIns="91440" tIns="45720" rIns="91440" bIns="45720" anchor="ctr"/>
           <a:lstStyle>
             <a:lvl1pPr algn="l">
               <a:defRPr sz="1200" dirty="0">
@@ -2818,10 +2760,9 @@
             </a:lvl1pPr>
           </a:lstStyle>
           <a:p>
-            <a:pPr/>
             <a:fld id="{5455A7CF-DB6C-4325-93B5-8C3F06D80356}" type="datetimeFigureOut">
               <a:rPr lang="en-US" dirty="0"/>
-              <a:t>25-Nov-22</a:t>
+              <a:t>1/19/2024</a:t>
             </a:fld>
             <a:endParaRPr lang="en-US" dirty="0"/>
           </a:p>
@@ -2851,7 +2792,7 @@
           </a:ln>
         </p:spPr>
         <p:txBody>
-          <a:bodyPr lIns="91440" tIns="45720" rIns="91440" bIns="45720" anchor="ctr" wrap="square"/>
+          <a:bodyPr wrap="square" lIns="91440" tIns="45720" rIns="91440" bIns="45720" anchor="ctr"/>
           <a:lstStyle>
             <a:lvl1pPr algn="ctr">
               <a:defRPr sz="1200" dirty="0">
@@ -2864,7 +2805,6 @@
             </a:lvl1pPr>
           </a:lstStyle>
           <a:p>
-            <a:pPr/>
             <a:endParaRPr lang="en-US" dirty="0"/>
           </a:p>
         </p:txBody>
@@ -2893,7 +2833,7 @@
           </a:ln>
         </p:spPr>
         <p:txBody>
-          <a:bodyPr lIns="91440" tIns="45720" rIns="91440" bIns="45720" anchor="ctr" wrap="square"/>
+          <a:bodyPr wrap="square" lIns="91440" tIns="45720" rIns="91440" bIns="45720" anchor="ctr"/>
           <a:lstStyle>
             <a:lvl1pPr algn="r">
               <a:defRPr sz="1200" dirty="0">
@@ -2906,7 +2846,6 @@
             </a:lvl1pPr>
           </a:lstStyle>
           <a:p>
-            <a:pPr/>
             <a:fld id="{24E76E65-7777-4C32-B153-6028045D6BD3}" type="slidenum">
               <a:rPr lang="en-US" dirty="0"/>
               <a:t>‹#›</a:t>
@@ -2981,7 +2920,7 @@
   </p:sldLayoutIdLst>
   <p:txStyles>
     <p:titleStyle>
-      <a:lvl1pPr rtl="0" algn="l" defTabSz="914400">
+      <a:lvl1pPr algn="l" defTabSz="914400" rtl="0">
         <a:lnSpc>
           <a:spcPct val="90000"/>
         </a:lnSpc>
@@ -3000,7 +2939,7 @@
       </a:lvl1pPr>
     </p:titleStyle>
     <p:bodyStyle>
-      <a:lvl1pPr marL="228600" indent="-228600" rtl="0" algn="l" defTabSz="914400">
+      <a:lvl1pPr marL="228600" indent="-228600" algn="l" defTabSz="914400" rtl="0">
         <a:lnSpc>
           <a:spcPct val="90000"/>
         </a:lnSpc>
@@ -3018,7 +2957,7 @@
           <a:cs typeface="+mn-cs"/>
         </a:defRPr>
       </a:lvl1pPr>
-      <a:lvl2pPr marL="685800" indent="-228600" rtl="0" algn="l" defTabSz="914400">
+      <a:lvl2pPr marL="685800" indent="-228600" algn="l" defTabSz="914400" rtl="0">
         <a:lnSpc>
           <a:spcPct val="90000"/>
         </a:lnSpc>
@@ -3036,7 +2975,7 @@
           <a:cs typeface="+mn-cs"/>
         </a:defRPr>
       </a:lvl2pPr>
-      <a:lvl3pPr marL="1143000" indent="-228600" rtl="0" algn="l" defTabSz="914400">
+      <a:lvl3pPr marL="1143000" indent="-228600" algn="l" defTabSz="914400" rtl="0">
         <a:lnSpc>
           <a:spcPct val="90000"/>
         </a:lnSpc>
@@ -3054,7 +2993,7 @@
           <a:cs typeface="+mn-cs"/>
         </a:defRPr>
       </a:lvl3pPr>
-      <a:lvl4pPr marL="1600200" indent="-228600" rtl="0" algn="l" defTabSz="914400">
+      <a:lvl4pPr marL="1600200" indent="-228600" algn="l" defTabSz="914400" rtl="0">
         <a:lnSpc>
           <a:spcPct val="90000"/>
         </a:lnSpc>
@@ -3072,7 +3011,7 @@
           <a:cs typeface="+mn-cs"/>
         </a:defRPr>
       </a:lvl4pPr>
-      <a:lvl5pPr marL="2057400" indent="-228600" rtl="0" algn="l" defTabSz="914400">
+      <a:lvl5pPr marL="2057400" indent="-228600" algn="l" defTabSz="914400" rtl="0">
         <a:lnSpc>
           <a:spcPct val="90000"/>
         </a:lnSpc>
@@ -3090,7 +3029,7 @@
           <a:cs typeface="+mn-cs"/>
         </a:defRPr>
       </a:lvl5pPr>
-      <a:lvl6pPr marL="2514600" indent="-228600" rtl="0" algn="l" defTabSz="914400">
+      <a:lvl6pPr marL="2514600" indent="-228600" algn="l" defTabSz="914400" rtl="0">
         <a:lnSpc>
           <a:spcPct val="90000"/>
         </a:lnSpc>
@@ -3108,7 +3047,7 @@
           <a:cs typeface="+mn-cs"/>
         </a:defRPr>
       </a:lvl6pPr>
-      <a:lvl7pPr marL="2971800" indent="-228600" rtl="0" algn="l" defTabSz="914400">
+      <a:lvl7pPr marL="2971800" indent="-228600" algn="l" defTabSz="914400" rtl="0">
         <a:lnSpc>
           <a:spcPct val="90000"/>
         </a:lnSpc>
@@ -3126,7 +3065,7 @@
           <a:cs typeface="+mn-cs"/>
         </a:defRPr>
       </a:lvl7pPr>
-      <a:lvl8pPr marL="3429000" indent="-228600" rtl="0" algn="l" defTabSz="914400">
+      <a:lvl8pPr marL="3429000" indent="-228600" algn="l" defTabSz="914400" rtl="0">
         <a:lnSpc>
           <a:spcPct val="90000"/>
         </a:lnSpc>
@@ -3144,7 +3083,7 @@
           <a:cs typeface="+mn-cs"/>
         </a:defRPr>
       </a:lvl8pPr>
-      <a:lvl9pPr marL="3886200" indent="-228600" rtl="0" algn="l" defTabSz="914400">
+      <a:lvl9pPr marL="3886200" indent="-228600" algn="l" defTabSz="914400" rtl="0">
         <a:lnSpc>
           <a:spcPct val="90000"/>
         </a:lnSpc>
@@ -3167,7 +3106,7 @@
       <a:defPPr defTabSz="914400">
         <a:defRPr lang="en-US" dirty="0"/>
       </a:defPPr>
-      <a:lvl1pPr marL="0" rtl="0" algn="l" defTabSz="914400">
+      <a:lvl1pPr marL="0" algn="l" defTabSz="914400" rtl="0">
         <a:defRPr sz="1800" kern="1200" dirty="0">
           <a:solidFill>
             <a:schemeClr val="tx1"/>
@@ -3177,7 +3116,7 @@
           <a:cs typeface="+mn-cs"/>
         </a:defRPr>
       </a:lvl1pPr>
-      <a:lvl2pPr marL="457200" rtl="0" algn="l" defTabSz="914400">
+      <a:lvl2pPr marL="457200" algn="l" defTabSz="914400" rtl="0">
         <a:defRPr sz="1800" kern="1200" dirty="0">
           <a:solidFill>
             <a:schemeClr val="tx1"/>
@@ -3187,7 +3126,7 @@
           <a:cs typeface="+mn-cs"/>
         </a:defRPr>
       </a:lvl2pPr>
-      <a:lvl3pPr marL="914400" rtl="0" algn="l" defTabSz="914400">
+      <a:lvl3pPr marL="914400" algn="l" defTabSz="914400" rtl="0">
         <a:defRPr sz="1800" kern="1200" dirty="0">
           <a:solidFill>
             <a:schemeClr val="tx1"/>
@@ -3197,7 +3136,7 @@
           <a:cs typeface="+mn-cs"/>
         </a:defRPr>
       </a:lvl3pPr>
-      <a:lvl4pPr marL="1371600" rtl="0" algn="l" defTabSz="914400">
+      <a:lvl4pPr marL="1371600" algn="l" defTabSz="914400" rtl="0">
         <a:defRPr sz="1800" kern="1200" dirty="0">
           <a:solidFill>
             <a:schemeClr val="tx1"/>
@@ -3207,7 +3146,7 @@
           <a:cs typeface="+mn-cs"/>
         </a:defRPr>
       </a:lvl4pPr>
-      <a:lvl5pPr marL="1828800" rtl="0" algn="l" defTabSz="914400">
+      <a:lvl5pPr marL="1828800" algn="l" defTabSz="914400" rtl="0">
         <a:defRPr sz="1800" kern="1200" dirty="0">
           <a:solidFill>
             <a:schemeClr val="tx1"/>
@@ -3217,7 +3156,7 @@
           <a:cs typeface="+mn-cs"/>
         </a:defRPr>
       </a:lvl5pPr>
-      <a:lvl6pPr marL="2286000" rtl="0" algn="l" defTabSz="914400">
+      <a:lvl6pPr marL="2286000" algn="l" defTabSz="914400" rtl="0">
         <a:defRPr sz="1800" kern="1200" dirty="0">
           <a:solidFill>
             <a:schemeClr val="tx1"/>
@@ -3227,7 +3166,7 @@
           <a:cs typeface="+mn-cs"/>
         </a:defRPr>
       </a:lvl6pPr>
-      <a:lvl7pPr marL="2743200" rtl="0" algn="l" defTabSz="914400">
+      <a:lvl7pPr marL="2743200" algn="l" defTabSz="914400" rtl="0">
         <a:defRPr sz="1800" kern="1200" dirty="0">
           <a:solidFill>
             <a:schemeClr val="tx1"/>
@@ -3237,7 +3176,7 @@
           <a:cs typeface="+mn-cs"/>
         </a:defRPr>
       </a:lvl7pPr>
-      <a:lvl8pPr marL="3200400" rtl="0" algn="l" defTabSz="914400">
+      <a:lvl8pPr marL="3200400" algn="l" defTabSz="914400" rtl="0">
         <a:defRPr sz="1800" kern="1200" dirty="0">
           <a:solidFill>
             <a:schemeClr val="tx1"/>
@@ -3247,7 +3186,7 @@
           <a:cs typeface="+mn-cs"/>
         </a:defRPr>
       </a:lvl8pPr>
-      <a:lvl9pPr marL="3657600" rtl="0" algn="l" defTabSz="914400">
+      <a:lvl9pPr marL="3657600" algn="l" defTabSz="914400" rtl="0">
         <a:defRPr sz="1800" kern="1200" dirty="0">
           <a:solidFill>
             <a:schemeClr val="tx1"/>
@@ -3301,7 +3240,9 @@
           <a:p>
             <a:pPr algn="ctr" defTabSz="914400"/>
             <a:r>
-              <a:rPr dirty="0"/>
+              <a:rPr dirty="0">
+                <a:latin typeface="Arial Unicode MS"/>
+              </a:rPr>
               <a:t>Company History</a:t>
             </a:r>
           </a:p>
@@ -3537,14 +3478,14 @@
             <a:pPr algn="l" defTabSz="914400"/>
             <a:r>
               <a:rPr lang="en-US" sz="4000" dirty="0">
-                <a:latin typeface="Helvetica CE 35 Thin"/>
+                <a:latin typeface="Arial Unicode MS"/>
                 <a:ea typeface="Helvetica CE 35 Thin"/>
                 <a:cs typeface="Helvetica CE 35 Thin"/>
               </a:rPr>
               <a:t>Product Overview</a:t>
             </a:r>
             <a:endParaRPr sz="4000" dirty="0">
-              <a:latin typeface="Helvetica CE 35 Thin"/>
+              <a:latin typeface="Arial Unicode MS"/>
               <a:ea typeface="Helvetica CE 35 Thin"/>
               <a:cs typeface="Helvetica CE 35 Thin"/>
             </a:endParaRPr>
@@ -3624,8 +3565,14 @@
                 <a:ea typeface="Calibri (Body)"/>
                 <a:cs typeface="Calibri (Body)"/>
               </a:rPr>
-              <a:t>In 2000, Adventure Works Cycles bought a small manufacturing plant, </a:t>
-            </a:r>
+              <a:t>In 2000, Adventure Works Cycles bought a small manufacturing plant, Importadores Neptuno, located in Mexico. Importadores Neptuno manufactures several critical subcomponents for the Adventure Works Cycles production line. </a:t>
+            </a:r>
+          </a:p>
+          <a:p>
+            <a:pPr marL="285750" indent="-285750" algn="l" defTabSz="914400">
+              <a:buFont typeface="Arial"/>
+              <a:buChar char="•"/>
+            </a:pPr>
             <a:r>
               <a:rPr lang="en-US" sz="1800" dirty="0">
                 <a:solidFill>
@@ -3635,79 +3582,7 @@
                 <a:ea typeface="Calibri (Body)"/>
                 <a:cs typeface="Calibri (Body)"/>
               </a:rPr>
-              <a:t>Importadores</a:t>
-            </a:r>
-            <a:r>
-              <a:rPr lang="en-US" sz="1800" dirty="0">
-                <a:solidFill>
-                  <a:srgbClr val="000000"/>
-                </a:solidFill>
-                <a:latin typeface="Calibri (Body)"/>
-                <a:ea typeface="Calibri (Body)"/>
-                <a:cs typeface="Calibri (Body)"/>
-              </a:rPr>
-              <a:t> Neptuno, located in Mexico. </a:t>
-            </a:r>
-            <a:r>
-              <a:rPr lang="en-US" sz="1800" dirty="0">
-                <a:solidFill>
-                  <a:srgbClr val="000000"/>
-                </a:solidFill>
-                <a:latin typeface="Calibri (Body)"/>
-                <a:ea typeface="Calibri (Body)"/>
-                <a:cs typeface="Calibri (Body)"/>
-              </a:rPr>
-              <a:t>Importadores</a:t>
-            </a:r>
-            <a:r>
-              <a:rPr lang="en-US" sz="1800" dirty="0">
-                <a:solidFill>
-                  <a:srgbClr val="000000"/>
-                </a:solidFill>
-                <a:latin typeface="Calibri (Body)"/>
-                <a:ea typeface="Calibri (Body)"/>
-                <a:cs typeface="Calibri (Body)"/>
-              </a:rPr>
-              <a:t> Neptuno manufactures several critical subcomponents for the Adventure Works Cycles production line. </a:t>
-            </a:r>
-          </a:p>
-          <a:p>
-            <a:pPr marL="285750" indent="-285750" algn="l" defTabSz="914400">
-              <a:buFont typeface="Arial"/>
-              <a:buChar char="•"/>
-            </a:pPr>
-            <a:r>
-              <a:rPr lang="en-US" sz="1800" dirty="0">
-                <a:solidFill>
-                  <a:srgbClr val="000000"/>
-                </a:solidFill>
-                <a:latin typeface="Calibri (Body)"/>
-                <a:ea typeface="Calibri (Body)"/>
-                <a:cs typeface="Calibri (Body)"/>
-              </a:rPr>
-              <a:t>These subcomponents are shipped to the Bothell location for final product assembly. In 2001, </a:t>
-            </a:r>
-            <a:r>
-              <a:rPr lang="en-US" sz="1800" dirty="0">
-                <a:solidFill>
-                  <a:srgbClr val="000000"/>
-                </a:solidFill>
-                <a:latin typeface="Calibri (Body)"/>
-                <a:ea typeface="Calibri (Body)"/>
-                <a:cs typeface="Calibri (Body)"/>
-              </a:rPr>
-              <a:t>Importadores</a:t>
-            </a:r>
-            <a:r>
-              <a:rPr lang="en-US" sz="1800" dirty="0">
-                <a:solidFill>
-                  <a:srgbClr val="000000"/>
-                </a:solidFill>
-                <a:latin typeface="Calibri (Body)"/>
-                <a:ea typeface="Calibri (Body)"/>
-                <a:cs typeface="Calibri (Body)"/>
-              </a:rPr>
-              <a:t> Neptuno, became the sole manufacturer and distributor of the touring bicycle productivity group.</a:t>
+              <a:t>These subcomponents are shipped to the Bothell location for final product assembly. In 2001, Importadores Neptuno, became the sole manufacturer and distributor of the touring bicycle productivity group.</a:t>
             </a:r>
           </a:p>
         </p:txBody>
@@ -3800,15 +3675,69 @@
                 <a:tableStyleId>{93296810-A885-4BE3-A3E7-6D5BEEA58F35}</a:tableStyleId>
               </a:tblPr>
               <a:tblGrid>
-                <a:gridCol w="1206500"/>
-                <a:gridCol w="1206500"/>
-                <a:gridCol w="1206500"/>
-                <a:gridCol w="1206500"/>
-                <a:gridCol w="1206500"/>
-                <a:gridCol w="1206500"/>
-                <a:gridCol w="1206500"/>
-                <a:gridCol w="1206500"/>
-                <a:gridCol w="1206500"/>
+                <a:gridCol w="1206500">
+                  <a:extLst>
+                    <a:ext uri="{9D8B030D-6E8A-4147-A177-3AD203B41FA5}">
+                      <a16:colId xmlns:a16="http://schemas.microsoft.com/office/drawing/2014/main" val="20000"/>
+                    </a:ext>
+                  </a:extLst>
+                </a:gridCol>
+                <a:gridCol w="1206500">
+                  <a:extLst>
+                    <a:ext uri="{9D8B030D-6E8A-4147-A177-3AD203B41FA5}">
+                      <a16:colId xmlns:a16="http://schemas.microsoft.com/office/drawing/2014/main" val="20001"/>
+                    </a:ext>
+                  </a:extLst>
+                </a:gridCol>
+                <a:gridCol w="1206500">
+                  <a:extLst>
+                    <a:ext uri="{9D8B030D-6E8A-4147-A177-3AD203B41FA5}">
+                      <a16:colId xmlns:a16="http://schemas.microsoft.com/office/drawing/2014/main" val="20002"/>
+                    </a:ext>
+                  </a:extLst>
+                </a:gridCol>
+                <a:gridCol w="1206500">
+                  <a:extLst>
+                    <a:ext uri="{9D8B030D-6E8A-4147-A177-3AD203B41FA5}">
+                      <a16:colId xmlns:a16="http://schemas.microsoft.com/office/drawing/2014/main" val="20003"/>
+                    </a:ext>
+                  </a:extLst>
+                </a:gridCol>
+                <a:gridCol w="1206500">
+                  <a:extLst>
+                    <a:ext uri="{9D8B030D-6E8A-4147-A177-3AD203B41FA5}">
+                      <a16:colId xmlns:a16="http://schemas.microsoft.com/office/drawing/2014/main" val="20004"/>
+                    </a:ext>
+                  </a:extLst>
+                </a:gridCol>
+                <a:gridCol w="1206500">
+                  <a:extLst>
+                    <a:ext uri="{9D8B030D-6E8A-4147-A177-3AD203B41FA5}">
+                      <a16:colId xmlns:a16="http://schemas.microsoft.com/office/drawing/2014/main" val="20005"/>
+                    </a:ext>
+                  </a:extLst>
+                </a:gridCol>
+                <a:gridCol w="1206500">
+                  <a:extLst>
+                    <a:ext uri="{9D8B030D-6E8A-4147-A177-3AD203B41FA5}">
+                      <a16:colId xmlns:a16="http://schemas.microsoft.com/office/drawing/2014/main" val="20006"/>
+                    </a:ext>
+                  </a:extLst>
+                </a:gridCol>
+                <a:gridCol w="1206500">
+                  <a:extLst>
+                    <a:ext uri="{9D8B030D-6E8A-4147-A177-3AD203B41FA5}">
+                      <a16:colId xmlns:a16="http://schemas.microsoft.com/office/drawing/2014/main" val="20007"/>
+                    </a:ext>
+                  </a:extLst>
+                </a:gridCol>
+                <a:gridCol w="1206500">
+                  <a:extLst>
+                    <a:ext uri="{9D8B030D-6E8A-4147-A177-3AD203B41FA5}">
+                      <a16:colId xmlns:a16="http://schemas.microsoft.com/office/drawing/2014/main" val="20008"/>
+                    </a:ext>
+                  </a:extLst>
+                </a:gridCol>
               </a:tblGrid>
               <a:tr h="968800">
                 <a:tc>
@@ -3955,6 +3884,11 @@
                   </a:txBody>
                   <a:tcPr anchor="ctr" horzOverflow="overflow"/>
                 </a:tc>
+                <a:extLst>
+                  <a:ext uri="{0D108BD9-81ED-4DB2-BD59-A6C34878D82A}">
+                    <a16:rowId xmlns:a16="http://schemas.microsoft.com/office/drawing/2014/main" val="10000"/>
+                  </a:ext>
+                </a:extLst>
               </a:tr>
               <a:tr h="440147">
                 <a:tc>
@@ -4101,6 +4035,11 @@
                   </a:txBody>
                   <a:tcPr horzOverflow="overflow"/>
                 </a:tc>
+                <a:extLst>
+                  <a:ext uri="{0D108BD9-81ED-4DB2-BD59-A6C34878D82A}">
+                    <a16:rowId xmlns:a16="http://schemas.microsoft.com/office/drawing/2014/main" val="10001"/>
+                  </a:ext>
+                </a:extLst>
               </a:tr>
               <a:tr h="440147">
                 <a:tc>
@@ -4247,6 +4186,11 @@
                   </a:txBody>
                   <a:tcPr horzOverflow="overflow"/>
                 </a:tc>
+                <a:extLst>
+                  <a:ext uri="{0D108BD9-81ED-4DB2-BD59-A6C34878D82A}">
+                    <a16:rowId xmlns:a16="http://schemas.microsoft.com/office/drawing/2014/main" val="10002"/>
+                  </a:ext>
+                </a:extLst>
               </a:tr>
               <a:tr h="440147">
                 <a:tc>
@@ -4393,6 +4337,11 @@
                   </a:txBody>
                   <a:tcPr horzOverflow="overflow"/>
                 </a:tc>
+                <a:extLst>
+                  <a:ext uri="{0D108BD9-81ED-4DB2-BD59-A6C34878D82A}">
+                    <a16:rowId xmlns:a16="http://schemas.microsoft.com/office/drawing/2014/main" val="10003"/>
+                  </a:ext>
+                </a:extLst>
               </a:tr>
               <a:tr h="440147">
                 <a:tc>
@@ -4539,6 +4488,11 @@
                   </a:txBody>
                   <a:tcPr horzOverflow="overflow"/>
                 </a:tc>
+                <a:extLst>
+                  <a:ext uri="{0D108BD9-81ED-4DB2-BD59-A6C34878D82A}">
+                    <a16:rowId xmlns:a16="http://schemas.microsoft.com/office/drawing/2014/main" val="10004"/>
+                  </a:ext>
+                </a:extLst>
               </a:tr>
               <a:tr h="440147">
                 <a:tc>
@@ -4685,6 +4639,11 @@
                   </a:txBody>
                   <a:tcPr horzOverflow="overflow"/>
                 </a:tc>
+                <a:extLst>
+                  <a:ext uri="{0D108BD9-81ED-4DB2-BD59-A6C34878D82A}">
+                    <a16:rowId xmlns:a16="http://schemas.microsoft.com/office/drawing/2014/main" val="10005"/>
+                  </a:ext>
+                </a:extLst>
               </a:tr>
               <a:tr h="440147">
                 <a:tc>
@@ -4831,6 +4790,11 @@
                   </a:txBody>
                   <a:tcPr horzOverflow="overflow"/>
                 </a:tc>
+                <a:extLst>
+                  <a:ext uri="{0D108BD9-81ED-4DB2-BD59-A6C34878D82A}">
+                    <a16:rowId xmlns:a16="http://schemas.microsoft.com/office/drawing/2014/main" val="10006"/>
+                  </a:ext>
+                </a:extLst>
               </a:tr>
               <a:tr h="440147">
                 <a:tc>
@@ -4977,6 +4941,11 @@
                   </a:txBody>
                   <a:tcPr horzOverflow="overflow"/>
                 </a:tc>
+                <a:extLst>
+                  <a:ext uri="{0D108BD9-81ED-4DB2-BD59-A6C34878D82A}">
+                    <a16:rowId xmlns:a16="http://schemas.microsoft.com/office/drawing/2014/main" val="10007"/>
+                  </a:ext>
+                </a:extLst>
               </a:tr>
               <a:tr h="440147">
                 <a:tc>
@@ -5123,6 +5092,11 @@
                   </a:txBody>
                   <a:tcPr horzOverflow="overflow"/>
                 </a:tc>
+                <a:extLst>
+                  <a:ext uri="{0D108BD9-81ED-4DB2-BD59-A6C34878D82A}">
+                    <a16:rowId xmlns:a16="http://schemas.microsoft.com/office/drawing/2014/main" val="10008"/>
+                  </a:ext>
+                </a:extLst>
               </a:tr>
               <a:tr h="440147">
                 <a:tc>
@@ -5269,6 +5243,11 @@
                   </a:txBody>
                   <a:tcPr horzOverflow="overflow"/>
                 </a:tc>
+                <a:extLst>
+                  <a:ext uri="{0D108BD9-81ED-4DB2-BD59-A6C34878D82A}">
+                    <a16:rowId xmlns:a16="http://schemas.microsoft.com/office/drawing/2014/main" val="10009"/>
+                  </a:ext>
+                </a:extLst>
               </a:tr>
             </a:tbl>
           </a:graphicData>
@@ -5290,7 +5269,7 @@
         <a:srgbClr val="000000"/>
       </a:dk1>
       <a:lt1>
-        <a:srgbClr val="ffffff"/>
+        <a:srgbClr val="FFFFFF"/>
       </a:lt1>
       <a:dk2>
         <a:srgbClr val="44546A"/>
@@ -5573,5 +5552,7 @@
       </a:bgFillStyleLst>
     </a:fmtScheme>
   </a:themeElements>
+  <a:objectDefaults/>
+  <a:extraClrSchemeLst/>
 </a:theme>
 </file>
</xml_diff>